<commit_message>
Final Review Lecture updated
</commit_message>
<xml_diff>
--- a/08_01ReviewCS152.pptx
+++ b/08_01ReviewCS152.pptx
@@ -268,231 +268,34 @@
 </p:presentation>
 </file>
 
-<file path=ppt/revisionInfo.xml><?xml version="1.0" encoding="utf-8"?>
-<p1510:revInfo xmlns:a="http://schemas.openxmlformats.org/drawingml/2006/main" xmlns:r="http://schemas.openxmlformats.org/officeDocument/2006/relationships" xmlns:p1510="http://schemas.microsoft.com/office/powerpoint/2015/10/main">
-  <p1510:revLst>
-    <p1510:client id="{84DACACE-2DE3-4604-8B72-D5B92A0860F6}" v="4" dt="2022-10-12T17:32:00.836"/>
-  </p1510:revLst>
-</p1510:revInfo>
-</file>
-
 <file path=ppt/changesInfos/changesInfo1.xml><?xml version="1.0" encoding="utf-8"?>
 <pc:chgInfo xmlns:a="http://schemas.openxmlformats.org/drawingml/2006/main" xmlns:r="http://schemas.openxmlformats.org/officeDocument/2006/relationships" xmlns:ac="http://schemas.microsoft.com/office/drawing/2013/main/command" xmlns:pc="http://schemas.microsoft.com/office/powerpoint/2013/main/command">
   <pc:docChgLst>
-    <pc:chgData name="Moraes,Marcia" userId="c9c67e8a-58e2-4733-9a1c-5d44fec4775b" providerId="ADAL" clId="{84DACACE-2DE3-4604-8B72-D5B92A0860F6}"/>
-    <pc:docChg chg="undo custSel addSld delSld modSld sldOrd">
-      <pc:chgData name="Moraes,Marcia" userId="c9c67e8a-58e2-4733-9a1c-5d44fec4775b" providerId="ADAL" clId="{84DACACE-2DE3-4604-8B72-D5B92A0860F6}" dt="2022-10-12T17:34:18.526" v="481" actId="5793"/>
+    <pc:chgData name="Marcia Moraes" userId="c9c67e8a-58e2-4733-9a1c-5d44fec4775b" providerId="ADAL" clId="{DCAE5560-EF62-4668-B72E-20B6268A3B46}"/>
+    <pc:docChg chg="modSld">
+      <pc:chgData name="Marcia Moraes" userId="c9c67e8a-58e2-4733-9a1c-5d44fec4775b" providerId="ADAL" clId="{DCAE5560-EF62-4668-B72E-20B6268A3B46}" dt="2023-03-08T01:02:11.636" v="9" actId="20577"/>
       <pc:docMkLst>
         <pc:docMk/>
       </pc:docMkLst>
-      <pc:sldChg chg="addSp delSp modSp mod">
-        <pc:chgData name="Moraes,Marcia" userId="c9c67e8a-58e2-4733-9a1c-5d44fec4775b" providerId="ADAL" clId="{84DACACE-2DE3-4604-8B72-D5B92A0860F6}" dt="2022-10-12T16:40:36.876" v="54" actId="1076"/>
+      <pc:sldChg chg="modSp">
+        <pc:chgData name="Marcia Moraes" userId="c9c67e8a-58e2-4733-9a1c-5d44fec4775b" providerId="ADAL" clId="{DCAE5560-EF62-4668-B72E-20B6268A3B46}" dt="2023-03-08T01:02:11.636" v="9" actId="20577"/>
         <pc:sldMkLst>
           <pc:docMk/>
-          <pc:sldMk cId="2583827647" sldId="291"/>
+          <pc:sldMk cId="2954226462" sldId="268"/>
         </pc:sldMkLst>
         <pc:spChg chg="mod">
-          <ac:chgData name="Moraes,Marcia" userId="c9c67e8a-58e2-4733-9a1c-5d44fec4775b" providerId="ADAL" clId="{84DACACE-2DE3-4604-8B72-D5B92A0860F6}" dt="2022-10-12T16:39:54.209" v="48" actId="20577"/>
+          <ac:chgData name="Marcia Moraes" userId="c9c67e8a-58e2-4733-9a1c-5d44fec4775b" providerId="ADAL" clId="{DCAE5560-EF62-4668-B72E-20B6268A3B46}" dt="2023-03-08T01:02:11.636" v="9" actId="20577"/>
           <ac:spMkLst>
             <pc:docMk/>
-            <pc:sldMk cId="2583827647" sldId="291"/>
-            <ac:spMk id="2" creationId="{6302E6FC-80C8-2F4C-A9F0-9B205434775A}"/>
-          </ac:spMkLst>
-        </pc:spChg>
-        <pc:spChg chg="add mod">
-          <ac:chgData name="Moraes,Marcia" userId="c9c67e8a-58e2-4733-9a1c-5d44fec4775b" providerId="ADAL" clId="{84DACACE-2DE3-4604-8B72-D5B92A0860F6}" dt="2022-10-12T16:40:36.876" v="54" actId="1076"/>
-          <ac:spMkLst>
-            <pc:docMk/>
-            <pc:sldMk cId="2583827647" sldId="291"/>
-            <ac:spMk id="4" creationId="{196B0711-35FF-9BC9-5C6D-1708FDC94EF6}"/>
-          </ac:spMkLst>
-        </pc:spChg>
-        <pc:spChg chg="del mod">
-          <ac:chgData name="Moraes,Marcia" userId="c9c67e8a-58e2-4733-9a1c-5d44fec4775b" providerId="ADAL" clId="{84DACACE-2DE3-4604-8B72-D5B92A0860F6}" dt="2022-10-12T16:39:42.393" v="1" actId="478"/>
-          <ac:spMkLst>
-            <pc:docMk/>
-            <pc:sldMk cId="2583827647" sldId="291"/>
-            <ac:spMk id="8" creationId="{D2DFF88A-01D2-8624-F615-1FE50F4EEFFA}"/>
+            <pc:sldMk cId="2954226462" sldId="268"/>
+            <ac:spMk id="7" creationId="{F1F79DD2-1F3F-234C-A44A-3A87D436D29A}"/>
           </ac:spMkLst>
         </pc:spChg>
       </pc:sldChg>
-      <pc:sldChg chg="modSp mod">
-        <pc:chgData name="Moraes,Marcia" userId="c9c67e8a-58e2-4733-9a1c-5d44fec4775b" providerId="ADAL" clId="{84DACACE-2DE3-4604-8B72-D5B92A0860F6}" dt="2022-10-12T17:22:27.653" v="288"/>
-        <pc:sldMkLst>
-          <pc:docMk/>
-          <pc:sldMk cId="3862158204" sldId="295"/>
-        </pc:sldMkLst>
-        <pc:spChg chg="mod">
-          <ac:chgData name="Moraes,Marcia" userId="c9c67e8a-58e2-4733-9a1c-5d44fec4775b" providerId="ADAL" clId="{84DACACE-2DE3-4604-8B72-D5B92A0860F6}" dt="2022-10-12T17:19:37.891" v="287" actId="20577"/>
-          <ac:spMkLst>
-            <pc:docMk/>
-            <pc:sldMk cId="3862158204" sldId="295"/>
-            <ac:spMk id="2" creationId="{6302E6FC-80C8-2F4C-A9F0-9B205434775A}"/>
-          </ac:spMkLst>
-        </pc:spChg>
-        <pc:spChg chg="mod">
-          <ac:chgData name="Moraes,Marcia" userId="c9c67e8a-58e2-4733-9a1c-5d44fec4775b" providerId="ADAL" clId="{84DACACE-2DE3-4604-8B72-D5B92A0860F6}" dt="2022-10-12T17:22:27.653" v="288"/>
-          <ac:spMkLst>
-            <pc:docMk/>
-            <pc:sldMk cId="3862158204" sldId="295"/>
-            <ac:spMk id="3" creationId="{1776BEE4-A494-F14A-319A-4421C2CE3DE8}"/>
-          </ac:spMkLst>
-        </pc:spChg>
-      </pc:sldChg>
-      <pc:sldChg chg="modSp add mod">
-        <pc:chgData name="Moraes,Marcia" userId="c9c67e8a-58e2-4733-9a1c-5d44fec4775b" providerId="ADAL" clId="{84DACACE-2DE3-4604-8B72-D5B92A0860F6}" dt="2022-10-12T16:41:26.648" v="62" actId="255"/>
-        <pc:sldMkLst>
-          <pc:docMk/>
-          <pc:sldMk cId="890186980" sldId="296"/>
-        </pc:sldMkLst>
-        <pc:spChg chg="mod">
-          <ac:chgData name="Moraes,Marcia" userId="c9c67e8a-58e2-4733-9a1c-5d44fec4775b" providerId="ADAL" clId="{84DACACE-2DE3-4604-8B72-D5B92A0860F6}" dt="2022-10-12T16:41:15.130" v="60" actId="1076"/>
-          <ac:spMkLst>
-            <pc:docMk/>
-            <pc:sldMk cId="890186980" sldId="296"/>
-            <ac:spMk id="2" creationId="{6302E6FC-80C8-2F4C-A9F0-9B205434775A}"/>
-          </ac:spMkLst>
-        </pc:spChg>
-        <pc:spChg chg="mod">
-          <ac:chgData name="Moraes,Marcia" userId="c9c67e8a-58e2-4733-9a1c-5d44fec4775b" providerId="ADAL" clId="{84DACACE-2DE3-4604-8B72-D5B92A0860F6}" dt="2022-10-12T16:41:26.648" v="62" actId="255"/>
-          <ac:spMkLst>
-            <pc:docMk/>
-            <pc:sldMk cId="890186980" sldId="296"/>
-            <ac:spMk id="4" creationId="{196B0711-35FF-9BC9-5C6D-1708FDC94EF6}"/>
-          </ac:spMkLst>
-        </pc:spChg>
-      </pc:sldChg>
-      <pc:sldChg chg="del">
-        <pc:chgData name="Moraes,Marcia" userId="c9c67e8a-58e2-4733-9a1c-5d44fec4775b" providerId="ADAL" clId="{84DACACE-2DE3-4604-8B72-D5B92A0860F6}" dt="2022-10-12T16:40:51.341" v="55" actId="47"/>
-        <pc:sldMkLst>
-          <pc:docMk/>
-          <pc:sldMk cId="2303370294" sldId="296"/>
-        </pc:sldMkLst>
-      </pc:sldChg>
-      <pc:sldChg chg="addSp modSp add mod">
-        <pc:chgData name="Moraes,Marcia" userId="c9c67e8a-58e2-4733-9a1c-5d44fec4775b" providerId="ADAL" clId="{84DACACE-2DE3-4604-8B72-D5B92A0860F6}" dt="2022-10-12T16:45:34.924" v="147" actId="1076"/>
-        <pc:sldMkLst>
-          <pc:docMk/>
-          <pc:sldMk cId="1465728886" sldId="297"/>
-        </pc:sldMkLst>
-        <pc:spChg chg="mod">
-          <ac:chgData name="Moraes,Marcia" userId="c9c67e8a-58e2-4733-9a1c-5d44fec4775b" providerId="ADAL" clId="{84DACACE-2DE3-4604-8B72-D5B92A0860F6}" dt="2022-10-12T16:44:56.702" v="146" actId="20577"/>
-          <ac:spMkLst>
-            <pc:docMk/>
-            <pc:sldMk cId="1465728886" sldId="297"/>
-            <ac:spMk id="2" creationId="{6302E6FC-80C8-2F4C-A9F0-9B205434775A}"/>
-          </ac:spMkLst>
-        </pc:spChg>
-        <pc:spChg chg="mod">
-          <ac:chgData name="Moraes,Marcia" userId="c9c67e8a-58e2-4733-9a1c-5d44fec4775b" providerId="ADAL" clId="{84DACACE-2DE3-4604-8B72-D5B92A0860F6}" dt="2022-10-12T16:45:34.924" v="147" actId="1076"/>
-          <ac:spMkLst>
-            <pc:docMk/>
-            <pc:sldMk cId="1465728886" sldId="297"/>
-            <ac:spMk id="4" creationId="{196B0711-35FF-9BC9-5C6D-1708FDC94EF6}"/>
-          </ac:spMkLst>
-        </pc:spChg>
-        <pc:spChg chg="add mod">
-          <ac:chgData name="Moraes,Marcia" userId="c9c67e8a-58e2-4733-9a1c-5d44fec4775b" providerId="ADAL" clId="{84DACACE-2DE3-4604-8B72-D5B92A0860F6}" dt="2022-10-12T16:44:47.407" v="129" actId="1076"/>
-          <ac:spMkLst>
-            <pc:docMk/>
-            <pc:sldMk cId="1465728886" sldId="297"/>
-            <ac:spMk id="5" creationId="{A2EAB4C6-19C9-1602-C813-D101959C9AE2}"/>
-          </ac:spMkLst>
-        </pc:spChg>
-        <pc:spChg chg="add mod">
-          <ac:chgData name="Moraes,Marcia" userId="c9c67e8a-58e2-4733-9a1c-5d44fec4775b" providerId="ADAL" clId="{84DACACE-2DE3-4604-8B72-D5B92A0860F6}" dt="2022-10-12T16:44:45.522" v="128" actId="1076"/>
-          <ac:spMkLst>
-            <pc:docMk/>
-            <pc:sldMk cId="1465728886" sldId="297"/>
-            <ac:spMk id="8" creationId="{B6E02BF0-B04E-767D-AF08-018A28EA3B66}"/>
-          </ac:spMkLst>
-        </pc:spChg>
-        <pc:picChg chg="add mod">
-          <ac:chgData name="Moraes,Marcia" userId="c9c67e8a-58e2-4733-9a1c-5d44fec4775b" providerId="ADAL" clId="{84DACACE-2DE3-4604-8B72-D5B92A0860F6}" dt="2022-10-12T16:44:43.018" v="127" actId="1076"/>
-          <ac:picMkLst>
-            <pc:docMk/>
-            <pc:sldMk cId="1465728886" sldId="297"/>
-            <ac:picMk id="7" creationId="{319A1D9E-70B9-1F2C-E389-63E3D079610F}"/>
-          </ac:picMkLst>
-        </pc:picChg>
-      </pc:sldChg>
-      <pc:sldChg chg="del">
-        <pc:chgData name="Moraes,Marcia" userId="c9c67e8a-58e2-4733-9a1c-5d44fec4775b" providerId="ADAL" clId="{84DACACE-2DE3-4604-8B72-D5B92A0860F6}" dt="2022-10-12T16:40:52.001" v="56" actId="47"/>
-        <pc:sldMkLst>
-          <pc:docMk/>
-          <pc:sldMk cId="3034061553" sldId="297"/>
-        </pc:sldMkLst>
-      </pc:sldChg>
-      <pc:sldChg chg="addSp modSp add mod">
-        <pc:chgData name="Moraes,Marcia" userId="c9c67e8a-58e2-4733-9a1c-5d44fec4775b" providerId="ADAL" clId="{84DACACE-2DE3-4604-8B72-D5B92A0860F6}" dt="2022-10-12T17:26:32.134" v="383" actId="692"/>
-        <pc:sldMkLst>
-          <pc:docMk/>
-          <pc:sldMk cId="769069863" sldId="298"/>
-        </pc:sldMkLst>
-        <pc:spChg chg="mod">
-          <ac:chgData name="Moraes,Marcia" userId="c9c67e8a-58e2-4733-9a1c-5d44fec4775b" providerId="ADAL" clId="{84DACACE-2DE3-4604-8B72-D5B92A0860F6}" dt="2022-10-12T17:24:02.582" v="332" actId="20577"/>
-          <ac:spMkLst>
-            <pc:docMk/>
-            <pc:sldMk cId="769069863" sldId="298"/>
-            <ac:spMk id="2" creationId="{6302E6FC-80C8-2F4C-A9F0-9B205434775A}"/>
-          </ac:spMkLst>
-        </pc:spChg>
-        <pc:spChg chg="mod">
-          <ac:chgData name="Moraes,Marcia" userId="c9c67e8a-58e2-4733-9a1c-5d44fec4775b" providerId="ADAL" clId="{84DACACE-2DE3-4604-8B72-D5B92A0860F6}" dt="2022-10-12T17:26:24.038" v="382" actId="692"/>
-          <ac:spMkLst>
-            <pc:docMk/>
-            <pc:sldMk cId="769069863" sldId="298"/>
-            <ac:spMk id="3" creationId="{1776BEE4-A494-F14A-319A-4421C2CE3DE8}"/>
-          </ac:spMkLst>
-        </pc:spChg>
-        <pc:spChg chg="add mod">
-          <ac:chgData name="Moraes,Marcia" userId="c9c67e8a-58e2-4733-9a1c-5d44fec4775b" providerId="ADAL" clId="{84DACACE-2DE3-4604-8B72-D5B92A0860F6}" dt="2022-10-12T17:26:32.134" v="383" actId="692"/>
-          <ac:spMkLst>
-            <pc:docMk/>
-            <pc:sldMk cId="769069863" sldId="298"/>
-            <ac:spMk id="5" creationId="{8CC1C842-A0F0-2022-7E31-EBAB57E8667C}"/>
-          </ac:spMkLst>
-        </pc:spChg>
-      </pc:sldChg>
-      <pc:sldChg chg="del">
-        <pc:chgData name="Moraes,Marcia" userId="c9c67e8a-58e2-4733-9a1c-5d44fec4775b" providerId="ADAL" clId="{84DACACE-2DE3-4604-8B72-D5B92A0860F6}" dt="2022-10-12T16:40:52.508" v="57" actId="47"/>
-        <pc:sldMkLst>
-          <pc:docMk/>
-          <pc:sldMk cId="2223967579" sldId="298"/>
-        </pc:sldMkLst>
-      </pc:sldChg>
-      <pc:sldChg chg="addSp delSp modSp add mod ord">
-        <pc:chgData name="Moraes,Marcia" userId="c9c67e8a-58e2-4733-9a1c-5d44fec4775b" providerId="ADAL" clId="{84DACACE-2DE3-4604-8B72-D5B92A0860F6}" dt="2022-10-12T17:34:18.526" v="481" actId="5793"/>
-        <pc:sldMkLst>
-          <pc:docMk/>
-          <pc:sldMk cId="3456761463" sldId="299"/>
-        </pc:sldMkLst>
-        <pc:spChg chg="mod">
-          <ac:chgData name="Moraes,Marcia" userId="c9c67e8a-58e2-4733-9a1c-5d44fec4775b" providerId="ADAL" clId="{84DACACE-2DE3-4604-8B72-D5B92A0860F6}" dt="2022-10-12T17:31:56.652" v="407" actId="20577"/>
-          <ac:spMkLst>
-            <pc:docMk/>
-            <pc:sldMk cId="3456761463" sldId="299"/>
-            <ac:spMk id="5" creationId="{C41A88B0-CF49-5149-8DBA-17B1BA803727}"/>
-          </ac:spMkLst>
-        </pc:spChg>
-        <pc:spChg chg="mod">
-          <ac:chgData name="Moraes,Marcia" userId="c9c67e8a-58e2-4733-9a1c-5d44fec4775b" providerId="ADAL" clId="{84DACACE-2DE3-4604-8B72-D5B92A0860F6}" dt="2022-10-12T17:34:18.526" v="481" actId="5793"/>
-          <ac:spMkLst>
-            <pc:docMk/>
-            <pc:sldMk cId="3456761463" sldId="299"/>
-            <ac:spMk id="7" creationId="{F1F79DD2-1F3F-234C-A44A-3A87D436D29A}"/>
-          </ac:spMkLst>
-        </pc:spChg>
-        <pc:picChg chg="add del">
-          <ac:chgData name="Moraes,Marcia" userId="c9c67e8a-58e2-4733-9a1c-5d44fec4775b" providerId="ADAL" clId="{84DACACE-2DE3-4604-8B72-D5B92A0860F6}" dt="2022-10-12T17:32:00.835" v="408" actId="478"/>
-          <ac:picMkLst>
-            <pc:docMk/>
-            <pc:sldMk cId="3456761463" sldId="299"/>
-            <ac:picMk id="2" creationId="{30878B4D-F875-D999-03FD-AC8C0457CDBC}"/>
-          </ac:picMkLst>
-        </pc:picChg>
-      </pc:sldChg>
     </pc:docChg>
+  </pc:docChgLst>
+  <pc:docChgLst>
+    <pc:chgData name="Moraes,Marcia" userId="c9c67e8a-58e2-4733-9a1c-5d44fec4775b" providerId="ADAL" clId="{84DACACE-2DE3-4604-8B72-D5B92A0860F6}"/>
   </pc:docChgLst>
 </pc:chgInfo>
 </file>
@@ -19623,22 +19426,16 @@
               <a:buChar char="•"/>
             </a:pPr>
             <a:r>
+              <a:rPr lang="en-US">
+                <a:sym typeface="Wingdings" panose="05000000000000000000" pitchFamily="2" charset="2"/>
+              </a:rPr>
+              <a:t>Friday March 10th: </a:t>
+            </a:r>
+            <a:r>
               <a:rPr lang="en-US" dirty="0">
                 <a:sym typeface="Wingdings" panose="05000000000000000000" pitchFamily="2" charset="2"/>
               </a:rPr>
-              <a:t>Friday Oct 14</a:t>
-            </a:r>
-            <a:r>
-              <a:rPr lang="en-US" baseline="30000" dirty="0">
-                <a:sym typeface="Wingdings" panose="05000000000000000000" pitchFamily="2" charset="2"/>
-              </a:rPr>
-              <a:t>th </a:t>
-            </a:r>
-            <a:r>
-              <a:rPr lang="en-US" dirty="0">
-                <a:sym typeface="Wingdings" panose="05000000000000000000" pitchFamily="2" charset="2"/>
-              </a:rPr>
-              <a:t>: Final Coding Exam and Final Canvas Exam</a:t>
+              <a:t>Final Coding Exam and Final Canvas Exam</a:t>
             </a:r>
             <a:endParaRPr lang="en-US" dirty="0"/>
           </a:p>
@@ -20359,13 +20156,13 @@
   <p:clrMapOvr>
     <a:masterClrMapping/>
   </p:clrMapOvr>
-  <mc:AlternateContent xmlns:mc="http://schemas.openxmlformats.org/markup-compatibility/2006">
-    <mc:Choice xmlns:p14="http://schemas.microsoft.com/office/powerpoint/2010/main" Requires="p14">
+  <mc:AlternateContent xmlns:mc="http://schemas.openxmlformats.org/markup-compatibility/2006" xmlns:p14="http://schemas.microsoft.com/office/powerpoint/2010/main">
+    <mc:Choice Requires="p14">
       <p:transition p14:dur="300">
         <p:fade/>
       </p:transition>
     </mc:Choice>
-    <mc:Fallback>
+    <mc:Fallback xmlns="">
       <p:transition>
         <p:fade/>
       </p:transition>
@@ -21019,13 +20816,13 @@
   <p:clrMapOvr>
     <a:masterClrMapping/>
   </p:clrMapOvr>
-  <mc:AlternateContent xmlns:mc="http://schemas.openxmlformats.org/markup-compatibility/2006">
-    <mc:Choice xmlns:p14="http://schemas.microsoft.com/office/powerpoint/2010/main" Requires="p14">
+  <mc:AlternateContent xmlns:mc="http://schemas.openxmlformats.org/markup-compatibility/2006" xmlns:p14="http://schemas.microsoft.com/office/powerpoint/2010/main">
+    <mc:Choice Requires="p14">
       <p:transition p14:dur="300">
         <p:fade/>
       </p:transition>
     </mc:Choice>
-    <mc:Fallback>
+    <mc:Fallback xmlns="">
       <p:transition>
         <p:fade/>
       </p:transition>
@@ -21806,13 +21603,13 @@
   <p:clrMapOvr>
     <a:masterClrMapping/>
   </p:clrMapOvr>
-  <mc:AlternateContent xmlns:mc="http://schemas.openxmlformats.org/markup-compatibility/2006">
-    <mc:Choice xmlns:p14="http://schemas.microsoft.com/office/powerpoint/2010/main" Requires="p14">
+  <mc:AlternateContent xmlns:mc="http://schemas.openxmlformats.org/markup-compatibility/2006" xmlns:p14="http://schemas.microsoft.com/office/powerpoint/2010/main">
+    <mc:Choice Requires="p14">
       <p:transition p14:dur="300">
         <p:fade/>
       </p:transition>
     </mc:Choice>
-    <mc:Fallback>
+    <mc:Fallback xmlns="">
       <p:transition>
         <p:fade/>
       </p:transition>
@@ -23094,18 +22891,18 @@
 </file>
 
 <file path=customXml/item2.xml><?xml version="1.0" encoding="utf-8"?>
-<p:properties xmlns:p="http://schemas.microsoft.com/office/2006/metadata/properties" xmlns:xsi="http://www.w3.org/2001/XMLSchema-instance" xmlns:pc="http://schemas.microsoft.com/office/infopath/2007/PartnerControls">
-  <documentManagement/>
-</p:properties>
-</file>
-
-<file path=customXml/item3.xml><?xml version="1.0" encoding="utf-8"?>
 <?mso-contentType ?>
 <FormTemplates xmlns="http://schemas.microsoft.com/sharepoint/v3/contenttype/forms">
   <Display>DocumentLibraryForm</Display>
   <Edit>DocumentLibraryForm</Edit>
   <New>DocumentLibraryForm</New>
 </FormTemplates>
+</file>
+
+<file path=customXml/item3.xml><?xml version="1.0" encoding="utf-8"?>
+<p:properties xmlns:p="http://schemas.microsoft.com/office/2006/metadata/properties" xmlns:xsi="http://www.w3.org/2001/XMLSchema-instance" xmlns:pc="http://schemas.microsoft.com/office/infopath/2007/PartnerControls">
+  <documentManagement/>
+</p:properties>
 </file>
 
 <file path=customXml/itemProps1.xml><?xml version="1.0" encoding="utf-8"?>
@@ -23128,26 +22925,26 @@
 </file>
 
 <file path=customXml/itemProps2.xml><?xml version="1.0" encoding="utf-8"?>
-<ds:datastoreItem xmlns:ds="http://schemas.openxmlformats.org/officeDocument/2006/customXml" ds:itemID="{05D3EE4C-68D3-4BA3-94E6-383E2DFDD168}">
+<ds:datastoreItem xmlns:ds="http://schemas.openxmlformats.org/officeDocument/2006/customXml" ds:itemID="{ECBA097B-6123-4B8A-8BF9-8745C25437D5}">
   <ds:schemaRefs>
-    <ds:schemaRef ds:uri="http://schemas.microsoft.com/office/2006/documentManagement/types"/>
-    <ds:schemaRef ds:uri="http://schemas.microsoft.com/office/infopath/2007/PartnerControls"/>
-    <ds:schemaRef ds:uri="http://purl.org/dc/dcmitype/"/>
-    <ds:schemaRef ds:uri="http://purl.org/dc/elements/1.1/"/>
-    <ds:schemaRef ds:uri="e06ed288-fd75-4b50-bbed-f5a5df88c31c"/>
-    <ds:schemaRef ds:uri="http://schemas.microsoft.com/office/2006/metadata/properties"/>
-    <ds:schemaRef ds:uri="http://purl.org/dc/terms/"/>
-    <ds:schemaRef ds:uri="http://schemas.openxmlformats.org/package/2006/metadata/core-properties"/>
-    <ds:schemaRef ds:uri="92c41bee-f0ee-4aa6-9399-a35fbb883510"/>
-    <ds:schemaRef ds:uri="http://www.w3.org/XML/1998/namespace"/>
+    <ds:schemaRef ds:uri="http://schemas.microsoft.com/sharepoint/v3/contenttype/forms"/>
   </ds:schemaRefs>
 </ds:datastoreItem>
 </file>
 
 <file path=customXml/itemProps3.xml><?xml version="1.0" encoding="utf-8"?>
-<ds:datastoreItem xmlns:ds="http://schemas.openxmlformats.org/officeDocument/2006/customXml" ds:itemID="{ECBA097B-6123-4B8A-8BF9-8745C25437D5}">
+<ds:datastoreItem xmlns:ds="http://schemas.openxmlformats.org/officeDocument/2006/customXml" ds:itemID="{05D3EE4C-68D3-4BA3-94E6-383E2DFDD168}">
   <ds:schemaRefs>
-    <ds:schemaRef ds:uri="http://schemas.microsoft.com/sharepoint/v3/contenttype/forms"/>
+    <ds:schemaRef ds:uri="http://purl.org/dc/elements/1.1/"/>
+    <ds:schemaRef ds:uri="http://purl.org/dc/dcmitype/"/>
+    <ds:schemaRef ds:uri="e06ed288-fd75-4b50-bbed-f5a5df88c31c"/>
+    <ds:schemaRef ds:uri="http://www.w3.org/XML/1998/namespace"/>
+    <ds:schemaRef ds:uri="http://schemas.microsoft.com/office/2006/documentManagement/types"/>
+    <ds:schemaRef ds:uri="92c41bee-f0ee-4aa6-9399-a35fbb883510"/>
+    <ds:schemaRef ds:uri="http://schemas.microsoft.com/office/infopath/2007/PartnerControls"/>
+    <ds:schemaRef ds:uri="http://schemas.openxmlformats.org/package/2006/metadata/core-properties"/>
+    <ds:schemaRef ds:uri="http://schemas.microsoft.com/office/2006/metadata/properties"/>
+    <ds:schemaRef ds:uri="http://purl.org/dc/terms/"/>
   </ds:schemaRefs>
 </ds:datastoreItem>
 </file>
</xml_diff>